<commit_message>
edited youtube link on report and powerpoint
</commit_message>
<xml_diff>
--- a/DS677 Final Project PPT.pptx
+++ b/DS677 Final Project PPT.pptx
@@ -10761,7 +10761,7 @@
           <a:p>
             <a:fld id="{98B4D092-1223-407B-AA7B-233CF43589DE}" type="datetimeFigureOut">
               <a:rPr lang="en-US" smtClean="0"/>
-              <a:t>5/11/2025</a:t>
+              <a:t>5/12/2025</a:t>
             </a:fld>
             <a:endParaRPr lang="en-US"/>
           </a:p>
@@ -11973,7 +11973,7 @@
           <a:p>
             <a:fld id="{E6A582B3-75AA-4D50-A5E8-123D6D0285BA}" type="datetimeFigureOut">
               <a:rPr lang="en-US" smtClean="0"/>
-              <a:t>5/11/2025</a:t>
+              <a:t>5/12/2025</a:t>
             </a:fld>
             <a:endParaRPr lang="en-US"/>
           </a:p>
@@ -12171,7 +12171,7 @@
           <a:p>
             <a:fld id="{E6A582B3-75AA-4D50-A5E8-123D6D0285BA}" type="datetimeFigureOut">
               <a:rPr lang="en-US" smtClean="0"/>
-              <a:t>5/11/2025</a:t>
+              <a:t>5/12/2025</a:t>
             </a:fld>
             <a:endParaRPr lang="en-US"/>
           </a:p>
@@ -12379,7 +12379,7 @@
           <a:p>
             <a:fld id="{E6A582B3-75AA-4D50-A5E8-123D6D0285BA}" type="datetimeFigureOut">
               <a:rPr lang="en-US" smtClean="0"/>
-              <a:t>5/11/2025</a:t>
+              <a:t>5/12/2025</a:t>
             </a:fld>
             <a:endParaRPr lang="en-US"/>
           </a:p>
@@ -12577,7 +12577,7 @@
           <a:p>
             <a:fld id="{E6A582B3-75AA-4D50-A5E8-123D6D0285BA}" type="datetimeFigureOut">
               <a:rPr lang="en-US" smtClean="0"/>
-              <a:t>5/11/2025</a:t>
+              <a:t>5/12/2025</a:t>
             </a:fld>
             <a:endParaRPr lang="en-US"/>
           </a:p>
@@ -12852,7 +12852,7 @@
           <a:p>
             <a:fld id="{E6A582B3-75AA-4D50-A5E8-123D6D0285BA}" type="datetimeFigureOut">
               <a:rPr lang="en-US" smtClean="0"/>
-              <a:t>5/11/2025</a:t>
+              <a:t>5/12/2025</a:t>
             </a:fld>
             <a:endParaRPr lang="en-US"/>
           </a:p>
@@ -13117,7 +13117,7 @@
           <a:p>
             <a:fld id="{E6A582B3-75AA-4D50-A5E8-123D6D0285BA}" type="datetimeFigureOut">
               <a:rPr lang="en-US" smtClean="0"/>
-              <a:t>5/11/2025</a:t>
+              <a:t>5/12/2025</a:t>
             </a:fld>
             <a:endParaRPr lang="en-US"/>
           </a:p>
@@ -13529,7 +13529,7 @@
           <a:p>
             <a:fld id="{E6A582B3-75AA-4D50-A5E8-123D6D0285BA}" type="datetimeFigureOut">
               <a:rPr lang="en-US" smtClean="0"/>
-              <a:t>5/11/2025</a:t>
+              <a:t>5/12/2025</a:t>
             </a:fld>
             <a:endParaRPr lang="en-US"/>
           </a:p>
@@ -13670,7 +13670,7 @@
           <a:p>
             <a:fld id="{E6A582B3-75AA-4D50-A5E8-123D6D0285BA}" type="datetimeFigureOut">
               <a:rPr lang="en-US" smtClean="0"/>
-              <a:t>5/11/2025</a:t>
+              <a:t>5/12/2025</a:t>
             </a:fld>
             <a:endParaRPr lang="en-US"/>
           </a:p>
@@ -13783,7 +13783,7 @@
           <a:p>
             <a:fld id="{E6A582B3-75AA-4D50-A5E8-123D6D0285BA}" type="datetimeFigureOut">
               <a:rPr lang="en-US" smtClean="0"/>
-              <a:t>5/11/2025</a:t>
+              <a:t>5/12/2025</a:t>
             </a:fld>
             <a:endParaRPr lang="en-US"/>
           </a:p>
@@ -14094,7 +14094,7 @@
           <a:p>
             <a:fld id="{E6A582B3-75AA-4D50-A5E8-123D6D0285BA}" type="datetimeFigureOut">
               <a:rPr lang="en-US" smtClean="0"/>
-              <a:t>5/11/2025</a:t>
+              <a:t>5/12/2025</a:t>
             </a:fld>
             <a:endParaRPr lang="en-US"/>
           </a:p>
@@ -14382,7 +14382,7 @@
           <a:p>
             <a:fld id="{E6A582B3-75AA-4D50-A5E8-123D6D0285BA}" type="datetimeFigureOut">
               <a:rPr lang="en-US" smtClean="0"/>
-              <a:t>5/11/2025</a:t>
+              <a:t>5/12/2025</a:t>
             </a:fld>
             <a:endParaRPr lang="en-US"/>
           </a:p>
@@ -14623,7 +14623,7 @@
           <a:p>
             <a:fld id="{E6A582B3-75AA-4D50-A5E8-123D6D0285BA}" type="datetimeFigureOut">
               <a:rPr lang="en-US" smtClean="0"/>
-              <a:t>5/11/2025</a:t>
+              <a:t>5/12/2025</a:t>
             </a:fld>
             <a:endParaRPr lang="en-US"/>
           </a:p>

</xml_diff>